<commit_message>
Update to slides and course script.
</commit_message>
<xml_diff>
--- a/Documents/Deck/Getting Started With Sparklyr.pptx
+++ b/Documents/Deck/Getting Started With Sparklyr.pptx
@@ -319,7 +319,7 @@
           <a:p>
             <a:fld id="{ECD19FB2-3AAB-4D03-B13A-2960828C78E3}" type="datetimeFigureOut">
               <a:rPr lang="en-US" dirty="0"/>
-              <a:t>2/18/2018</a:t>
+              <a:t>3/12/2018</a:t>
             </a:fld>
             <a:endParaRPr lang="en-US" dirty="0"/>
           </a:p>
@@ -600,7 +600,7 @@
           <a:p>
             <a:fld id="{1B80C674-7DFC-42FE-B9CD-82963CDB1557}" type="datetimeFigureOut">
               <a:rPr lang="en-US" dirty="0"/>
-              <a:t>2/18/2018</a:t>
+              <a:t>3/12/2018</a:t>
             </a:fld>
             <a:endParaRPr lang="en-US" dirty="0"/>
           </a:p>
@@ -791,7 +791,7 @@
           <a:p>
             <a:fld id="{2076456F-F47D-4F25-8053-2A695DA0CA7D}" type="datetimeFigureOut">
               <a:rPr lang="en-US" dirty="0"/>
-              <a:t>2/18/2018</a:t>
+              <a:t>3/12/2018</a:t>
             </a:fld>
             <a:endParaRPr lang="en-US" dirty="0"/>
           </a:p>
@@ -1051,7 +1051,7 @@
           <a:p>
             <a:fld id="{5D6C7379-69CC-4837-9905-BEBA22830C8A}" type="datetimeFigureOut">
               <a:rPr lang="en-US" dirty="0"/>
-              <a:t>2/18/2018</a:t>
+              <a:t>3/12/2018</a:t>
             </a:fld>
             <a:endParaRPr lang="en-US" dirty="0"/>
           </a:p>
@@ -1476,7 +1476,7 @@
           <a:p>
             <a:fld id="{49EB8B7E-8AEE-4F10-BFEE-C999AD004D36}" type="datetimeFigureOut">
               <a:rPr lang="en-US" dirty="0"/>
-              <a:t>2/18/2018</a:t>
+              <a:t>3/12/2018</a:t>
             </a:fld>
             <a:endParaRPr lang="en-US" dirty="0"/>
           </a:p>
@@ -2021,7 +2021,7 @@
           <a:p>
             <a:fld id="{8668F3F9-58BC-440B-B37B-805B9055EF92}" type="datetimeFigureOut">
               <a:rPr lang="en-US" dirty="0"/>
-              <a:t>2/18/2018</a:t>
+              <a:t>3/12/2018</a:t>
             </a:fld>
             <a:endParaRPr lang="en-US" dirty="0"/>
           </a:p>
@@ -2851,7 +2851,7 @@
           <a:p>
             <a:fld id="{0D5A53AF-48EA-489D-8260-9DCAB666386A}" type="datetimeFigureOut">
               <a:rPr lang="en-US" dirty="0"/>
-              <a:t>2/18/2018</a:t>
+              <a:t>3/12/2018</a:t>
             </a:fld>
             <a:endParaRPr lang="en-US" dirty="0"/>
           </a:p>
@@ -3020,7 +3020,7 @@
           <a:p>
             <a:fld id="{0DED02AE-B9A4-47BD-AF8E-97E16144138B}" type="datetimeFigureOut">
               <a:rPr lang="en-US" dirty="0"/>
-              <a:t>2/18/2018</a:t>
+              <a:t>3/12/2018</a:t>
             </a:fld>
             <a:endParaRPr lang="en-US" dirty="0"/>
           </a:p>
@@ -3199,7 +3199,7 @@
           <a:p>
             <a:fld id="{CF0FD78B-DB02-4362-BCDC-98A55456977C}" type="datetimeFigureOut">
               <a:rPr lang="en-US" dirty="0"/>
-              <a:t>2/18/2018</a:t>
+              <a:t>3/12/2018</a:t>
             </a:fld>
             <a:endParaRPr lang="en-US" dirty="0"/>
           </a:p>
@@ -3368,7 +3368,7 @@
           <a:p>
             <a:fld id="{99916976-5D93-46E4-A98A-FAD63E4D0EA8}" type="datetimeFigureOut">
               <a:rPr lang="en-US" dirty="0"/>
-              <a:t>2/18/2018</a:t>
+              <a:t>3/12/2018</a:t>
             </a:fld>
             <a:endParaRPr lang="en-US" dirty="0"/>
           </a:p>
@@ -3624,7 +3624,7 @@
           <a:p>
             <a:fld id="{0F39F4F5-F4D2-4D2A-AB60-88D37ADCB869}" type="datetimeFigureOut">
               <a:rPr lang="en-US" dirty="0"/>
-              <a:t>2/18/2018</a:t>
+              <a:t>3/12/2018</a:t>
             </a:fld>
             <a:endParaRPr lang="en-US" dirty="0"/>
           </a:p>
@@ -3855,7 +3855,7 @@
           <a:p>
             <a:fld id="{D23BC6CE-6D1E-47E5-8859-F31AC5380EB2}" type="datetimeFigureOut">
               <a:rPr lang="en-US" dirty="0"/>
-              <a:t>2/18/2018</a:t>
+              <a:t>3/12/2018</a:t>
             </a:fld>
             <a:endParaRPr lang="en-US" dirty="0"/>
           </a:p>
@@ -4247,7 +4247,7 @@
           <a:p>
             <a:fld id="{B1B4E7C4-4DA4-404D-9965-B13F2DD7D8BF}" type="datetimeFigureOut">
               <a:rPr lang="en-US" dirty="0"/>
-              <a:t>2/18/2018</a:t>
+              <a:t>3/12/2018</a:t>
             </a:fld>
             <a:endParaRPr lang="en-US" dirty="0"/>
           </a:p>
@@ -4364,7 +4364,7 @@
           <a:p>
             <a:fld id="{476FB7AA-4A53-424F-AD41-70827B6504BA}" type="datetimeFigureOut">
               <a:rPr lang="en-US" dirty="0"/>
-              <a:t>2/18/2018</a:t>
+              <a:t>3/12/2018</a:t>
             </a:fld>
             <a:endParaRPr lang="en-US" dirty="0"/>
           </a:p>
@@ -4458,7 +4458,7 @@
           <a:p>
             <a:fld id="{E7884882-FB12-4BC8-9960-9AD8104D7FAE}" type="datetimeFigureOut">
               <a:rPr lang="en-US" dirty="0"/>
-              <a:t>2/18/2018</a:t>
+              <a:t>3/12/2018</a:t>
             </a:fld>
             <a:endParaRPr lang="en-US" dirty="0"/>
           </a:p>
@@ -4730,7 +4730,7 @@
           <a:p>
             <a:fld id="{F7D1BD23-6E54-4D9D-AD88-A2813C73CC25}" type="datetimeFigureOut">
               <a:rPr lang="en-US" dirty="0"/>
-              <a:t>2/18/2018</a:t>
+              <a:t>3/12/2018</a:t>
             </a:fld>
             <a:endParaRPr lang="en-US" dirty="0"/>
           </a:p>
@@ -5010,7 +5010,7 @@
           <a:p>
             <a:fld id="{1471A834-4F3C-4AF9-9C74-05EC35A0F292}" type="datetimeFigureOut">
               <a:rPr lang="en-US" dirty="0"/>
-              <a:t>2/18/2018</a:t>
+              <a:t>3/12/2018</a:t>
             </a:fld>
             <a:endParaRPr lang="en-US" dirty="0"/>
           </a:p>
@@ -5249,7 +5249,7 @@
           <a:p>
             <a:fld id="{51CF1133-3259-4C45-BABA-5B62D9C6F78D}" type="datetimeFigureOut">
               <a:rPr lang="en-US" dirty="0"/>
-              <a:t>2/18/2018</a:t>
+              <a:t>3/12/2018</a:t>
             </a:fld>
             <a:endParaRPr lang="en-US" dirty="0"/>
           </a:p>
@@ -6305,20 +6305,14 @@
           <a:p>
             <a:pPr lvl="1"/>
             <a:r>
-              <a:rPr lang="en-US" sz="2800" dirty="0" err="1">
+              <a:rPr lang="en-US" sz="2800" dirty="0">
                 <a:solidFill>
                   <a:schemeClr val="tx1"/>
                 </a:solidFill>
                 <a:latin typeface="Adobe Caslon Pro" panose="0205050205050A020403"/>
               </a:rPr>
-              <a:t>Commerical</a:t>
-            </a:r>
-            <a:endParaRPr lang="en-US" sz="2800" dirty="0">
-              <a:solidFill>
-                <a:schemeClr val="tx1"/>
-              </a:solidFill>
-              <a:latin typeface="Adobe Caslon Pro" panose="0205050205050A020403"/>
-            </a:endParaRPr>
+              <a:t>Commercial</a:t>
+            </a:r>
           </a:p>
           <a:p>
             <a:pPr lvl="1"/>

</xml_diff>